<commit_message>
Mutual information analysis before meeting Yuval
</commit_message>
<xml_diff>
--- a/CausalComp MLLS graphics.pptx
+++ b/CausalComp MLLS graphics.pptx
@@ -8,6 +8,7 @@
     <p:sldId id="258" r:id="rId2"/>
     <p:sldId id="256" r:id="rId3"/>
     <p:sldId id="257" r:id="rId4"/>
+    <p:sldId id="259" r:id="rId5"/>
   </p:sldIdLst>
   <p:sldSz cx="12192000" cy="6858000"/>
   <p:notesSz cx="6858000" cy="9144000"/>
@@ -106,6 +107,11 @@
       </a:defRPr>
     </a:lvl9pPr>
   </p:defaultTextStyle>
+  <p:extLst>
+    <p:ext uri="{EFAFB233-063F-42B5-8137-9DF3F51BA10A}">
+      <p15:sldGuideLst xmlns:p15="http://schemas.microsoft.com/office/powerpoint/2012/main"/>
+    </p:ext>
+  </p:extLst>
 </p:presentation>
 </file>
 
@@ -258,7 +264,7 @@
           <a:p>
             <a:fld id="{B68F7D41-87C6-424E-9CBC-7FFD6E461059}" type="datetimeFigureOut">
               <a:rPr lang="en-IL" smtClean="0"/>
-              <a:t>25/03/2022</a:t>
+              <a:t>28/03/2022</a:t>
             </a:fld>
             <a:endParaRPr lang="en-IL"/>
           </a:p>
@@ -458,7 +464,7 @@
           <a:p>
             <a:fld id="{B68F7D41-87C6-424E-9CBC-7FFD6E461059}" type="datetimeFigureOut">
               <a:rPr lang="en-IL" smtClean="0"/>
-              <a:t>25/03/2022</a:t>
+              <a:t>28/03/2022</a:t>
             </a:fld>
             <a:endParaRPr lang="en-IL"/>
           </a:p>
@@ -668,7 +674,7 @@
           <a:p>
             <a:fld id="{B68F7D41-87C6-424E-9CBC-7FFD6E461059}" type="datetimeFigureOut">
               <a:rPr lang="en-IL" smtClean="0"/>
-              <a:t>25/03/2022</a:t>
+              <a:t>28/03/2022</a:t>
             </a:fld>
             <a:endParaRPr lang="en-IL"/>
           </a:p>
@@ -868,7 +874,7 @@
           <a:p>
             <a:fld id="{B68F7D41-87C6-424E-9CBC-7FFD6E461059}" type="datetimeFigureOut">
               <a:rPr lang="en-IL" smtClean="0"/>
-              <a:t>25/03/2022</a:t>
+              <a:t>28/03/2022</a:t>
             </a:fld>
             <a:endParaRPr lang="en-IL"/>
           </a:p>
@@ -1144,7 +1150,7 @@
           <a:p>
             <a:fld id="{B68F7D41-87C6-424E-9CBC-7FFD6E461059}" type="datetimeFigureOut">
               <a:rPr lang="en-IL" smtClean="0"/>
-              <a:t>25/03/2022</a:t>
+              <a:t>28/03/2022</a:t>
             </a:fld>
             <a:endParaRPr lang="en-IL"/>
           </a:p>
@@ -1412,7 +1418,7 @@
           <a:p>
             <a:fld id="{B68F7D41-87C6-424E-9CBC-7FFD6E461059}" type="datetimeFigureOut">
               <a:rPr lang="en-IL" smtClean="0"/>
-              <a:t>25/03/2022</a:t>
+              <a:t>28/03/2022</a:t>
             </a:fld>
             <a:endParaRPr lang="en-IL"/>
           </a:p>
@@ -1827,7 +1833,7 @@
           <a:p>
             <a:fld id="{B68F7D41-87C6-424E-9CBC-7FFD6E461059}" type="datetimeFigureOut">
               <a:rPr lang="en-IL" smtClean="0"/>
-              <a:t>25/03/2022</a:t>
+              <a:t>28/03/2022</a:t>
             </a:fld>
             <a:endParaRPr lang="en-IL"/>
           </a:p>
@@ -1969,7 +1975,7 @@
           <a:p>
             <a:fld id="{B68F7D41-87C6-424E-9CBC-7FFD6E461059}" type="datetimeFigureOut">
               <a:rPr lang="en-IL" smtClean="0"/>
-              <a:t>25/03/2022</a:t>
+              <a:t>28/03/2022</a:t>
             </a:fld>
             <a:endParaRPr lang="en-IL"/>
           </a:p>
@@ -2082,7 +2088,7 @@
           <a:p>
             <a:fld id="{B68F7D41-87C6-424E-9CBC-7FFD6E461059}" type="datetimeFigureOut">
               <a:rPr lang="en-IL" smtClean="0"/>
-              <a:t>25/03/2022</a:t>
+              <a:t>28/03/2022</a:t>
             </a:fld>
             <a:endParaRPr lang="en-IL"/>
           </a:p>
@@ -2395,7 +2401,7 @@
           <a:p>
             <a:fld id="{B68F7D41-87C6-424E-9CBC-7FFD6E461059}" type="datetimeFigureOut">
               <a:rPr lang="en-IL" smtClean="0"/>
-              <a:t>25/03/2022</a:t>
+              <a:t>28/03/2022</a:t>
             </a:fld>
             <a:endParaRPr lang="en-IL"/>
           </a:p>
@@ -2684,7 +2690,7 @@
           <a:p>
             <a:fld id="{B68F7D41-87C6-424E-9CBC-7FFD6E461059}" type="datetimeFigureOut">
               <a:rPr lang="en-IL" smtClean="0"/>
-              <a:t>25/03/2022</a:t>
+              <a:t>28/03/2022</a:t>
             </a:fld>
             <a:endParaRPr lang="en-IL"/>
           </a:p>
@@ -2927,7 +2933,7 @@
           <a:p>
             <a:fld id="{B68F7D41-87C6-424E-9CBC-7FFD6E461059}" type="datetimeFigureOut">
               <a:rPr lang="en-IL" smtClean="0"/>
-              <a:t>25/03/2022</a:t>
+              <a:t>28/03/2022</a:t>
             </a:fld>
             <a:endParaRPr lang="en-IL"/>
           </a:p>
@@ -6451,6 +6457,147 @@
     <p:extLst>
       <p:ext uri="{BB962C8B-B14F-4D97-AF65-F5344CB8AC3E}">
         <p14:creationId xmlns:p14="http://schemas.microsoft.com/office/powerpoint/2010/main" val="1461162224"/>
+      </p:ext>
+    </p:extLst>
+  </p:cSld>
+  <p:clrMapOvr>
+    <a:masterClrMapping/>
+  </p:clrMapOvr>
+</p:sld>
+</file>
+
+<file path=ppt/slides/slide4.xml><?xml version="1.0" encoding="utf-8"?>
+<p:sld xmlns:a="http://schemas.openxmlformats.org/drawingml/2006/main" xmlns:r="http://schemas.openxmlformats.org/officeDocument/2006/relationships" xmlns:p="http://schemas.openxmlformats.org/presentationml/2006/main">
+  <p:cSld>
+    <p:spTree>
+      <p:nvGrpSpPr>
+        <p:cNvPr id="1" name=""/>
+        <p:cNvGrpSpPr/>
+        <p:nvPr/>
+      </p:nvGrpSpPr>
+      <p:grpSpPr>
+        <a:xfrm>
+          <a:off x="0" y="0"/>
+          <a:ext cx="0" cy="0"/>
+          <a:chOff x="0" y="0"/>
+          <a:chExt cx="0" cy="0"/>
+        </a:xfrm>
+      </p:grpSpPr>
+      <p:pic>
+        <p:nvPicPr>
+          <p:cNvPr id="8" name="Picture 7">
+            <a:extLst>
+              <a:ext uri="{FF2B5EF4-FFF2-40B4-BE49-F238E27FC236}">
+                <a16:creationId xmlns:a16="http://schemas.microsoft.com/office/drawing/2014/main" id="{04C01975-8D60-43B0-8D87-89472317D67F}"/>
+              </a:ext>
+            </a:extLst>
+          </p:cNvPr>
+          <p:cNvPicPr>
+            <a:picLocks noChangeAspect="1"/>
+          </p:cNvPicPr>
+          <p:nvPr/>
+        </p:nvPicPr>
+        <p:blipFill rotWithShape="1">
+          <a:blip r:embed="rId2"/>
+          <a:srcRect b="2053"/>
+          <a:stretch/>
+        </p:blipFill>
+        <p:spPr>
+          <a:xfrm>
+            <a:off x="462003" y="1838103"/>
+            <a:ext cx="5344271" cy="3181794"/>
+          </a:xfrm>
+          <a:prstGeom prst="rect">
+            <a:avLst/>
+          </a:prstGeom>
+        </p:spPr>
+      </p:pic>
+      <p:pic>
+        <p:nvPicPr>
+          <p:cNvPr id="9" name="Picture 8">
+            <a:extLst>
+              <a:ext uri="{FF2B5EF4-FFF2-40B4-BE49-F238E27FC236}">
+                <a16:creationId xmlns:a16="http://schemas.microsoft.com/office/drawing/2014/main" id="{A3C11C26-D8B2-465B-B484-760B5C421017}"/>
+              </a:ext>
+            </a:extLst>
+          </p:cNvPr>
+          <p:cNvPicPr>
+            <a:picLocks noChangeAspect="1"/>
+          </p:cNvPicPr>
+          <p:nvPr/>
+        </p:nvPicPr>
+        <p:blipFill>
+          <a:blip r:embed="rId3"/>
+          <a:stretch>
+            <a:fillRect/>
+          </a:stretch>
+        </p:blipFill>
+        <p:spPr>
+          <a:xfrm>
+            <a:off x="5733457" y="1838103"/>
+            <a:ext cx="5515745" cy="3181794"/>
+          </a:xfrm>
+          <a:prstGeom prst="rect">
+            <a:avLst/>
+          </a:prstGeom>
+        </p:spPr>
+      </p:pic>
+      <p:sp>
+        <p:nvSpPr>
+          <p:cNvPr id="5" name="Rectangle 4">
+            <a:extLst>
+              <a:ext uri="{FF2B5EF4-FFF2-40B4-BE49-F238E27FC236}">
+                <a16:creationId xmlns:a16="http://schemas.microsoft.com/office/drawing/2014/main" id="{F47ED27B-C8AC-43CA-81EF-38E7AA3CDF79}"/>
+              </a:ext>
+            </a:extLst>
+          </p:cNvPr>
+          <p:cNvSpPr/>
+          <p:nvPr/>
+        </p:nvSpPr>
+        <p:spPr>
+          <a:xfrm>
+            <a:off x="5877007" y="1898373"/>
+            <a:ext cx="5344271" cy="3061253"/>
+          </a:xfrm>
+          <a:prstGeom prst="rect">
+            <a:avLst/>
+          </a:prstGeom>
+          <a:noFill/>
+          <a:ln w="38100">
+            <a:solidFill>
+              <a:srgbClr val="FF0000"/>
+            </a:solidFill>
+          </a:ln>
+        </p:spPr>
+        <p:style>
+          <a:lnRef idx="2">
+            <a:schemeClr val="accent1">
+              <a:shade val="50000"/>
+            </a:schemeClr>
+          </a:lnRef>
+          <a:fillRef idx="1">
+            <a:schemeClr val="accent1"/>
+          </a:fillRef>
+          <a:effectRef idx="0">
+            <a:schemeClr val="accent1"/>
+          </a:effectRef>
+          <a:fontRef idx="minor">
+            <a:schemeClr val="lt1"/>
+          </a:fontRef>
+        </p:style>
+        <p:txBody>
+          <a:bodyPr rtlCol="0" anchor="ctr"/>
+          <a:lstStyle/>
+          <a:p>
+            <a:pPr algn="ctr"/>
+            <a:endParaRPr lang="en-IL" dirty="0"/>
+          </a:p>
+        </p:txBody>
+      </p:sp>
+    </p:spTree>
+    <p:extLst>
+      <p:ext uri="{BB962C8B-B14F-4D97-AF65-F5344CB8AC3E}">
+        <p14:creationId xmlns:p14="http://schemas.microsoft.com/office/powerpoint/2010/main" val="3609263248"/>
       </p:ext>
     </p:extLst>
   </p:cSld>

</xml_diff>